<commit_message>
Day 13 content and work note updated
</commit_message>
<xml_diff>
--- a/Day13/DockerAndKubernetes_Training-Day13.pptx
+++ b/Day13/DockerAndKubernetes_Training-Day13.pptx
@@ -199,7 +199,7 @@
           <a:p>
             <a:fld id="{B09F413D-6E72-4B8A-80ED-A580F7C91B71}" type="datetimeFigureOut">
               <a:rPr lang="en-IN" smtClean="0"/>
-              <a:t>23-04-2023</a:t>
+              <a:t>24-04-2023</a:t>
             </a:fld>
             <a:endParaRPr lang="en-IN"/>
           </a:p>
@@ -802,7 +802,7 @@
           <a:p>
             <a:fld id="{12E8600E-B0EE-4521-BF40-4B72FBA06775}" type="datetimeFigureOut">
               <a:rPr lang="en-IN" smtClean="0"/>
-              <a:t>23-04-2023</a:t>
+              <a:t>24-04-2023</a:t>
             </a:fld>
             <a:endParaRPr lang="en-IN"/>
           </a:p>
@@ -1891,7 +1891,7 @@
             <a:fld id="{49F3E739-D457-46E5-B626-C9B182A007EE}" type="datetimeFigureOut">
               <a:rPr lang="en-US" smtClean="0"/>
               <a:pPr/>
-              <a:t>4/23/2023</a:t>
+              <a:t>4/24/2023</a:t>
             </a:fld>
             <a:endParaRPr lang="en-US"/>
           </a:p>
@@ -2873,7 +2873,7 @@
             <a:fld id="{49F3E739-D457-46E5-B626-C9B182A007EE}" type="datetimeFigureOut">
               <a:rPr lang="en-US" smtClean="0"/>
               <a:pPr/>
-              <a:t>4/23/2023</a:t>
+              <a:t>4/24/2023</a:t>
             </a:fld>
             <a:endParaRPr lang="en-US"/>
           </a:p>
@@ -4009,7 +4009,7 @@
             <a:fld id="{49F3E739-D457-46E5-B626-C9B182A007EE}" type="datetimeFigureOut">
               <a:rPr lang="en-US" smtClean="0"/>
               <a:pPr/>
-              <a:t>4/23/2023</a:t>
+              <a:t>4/24/2023</a:t>
             </a:fld>
             <a:endParaRPr lang="en-US"/>
           </a:p>
@@ -5044,7 +5044,7 @@
             <a:fld id="{49F3E739-D457-46E5-B626-C9B182A007EE}" type="datetimeFigureOut">
               <a:rPr lang="en-US" smtClean="0"/>
               <a:pPr/>
-              <a:t>4/23/2023</a:t>
+              <a:t>4/24/2023</a:t>
             </a:fld>
             <a:endParaRPr lang="en-US"/>
           </a:p>
@@ -5706,7 +5706,7 @@
             <a:fld id="{49F3E739-D457-46E5-B626-C9B182A007EE}" type="datetimeFigureOut">
               <a:rPr lang="en-US" smtClean="0"/>
               <a:pPr/>
-              <a:t>4/23/2023</a:t>
+              <a:t>4/24/2023</a:t>
             </a:fld>
             <a:endParaRPr lang="en-US"/>
           </a:p>
@@ -6569,7 +6569,7 @@
             <a:fld id="{49F3E739-D457-46E5-B626-C9B182A007EE}" type="datetimeFigureOut">
               <a:rPr lang="en-US" smtClean="0"/>
               <a:pPr/>
-              <a:t>4/23/2023</a:t>
+              <a:t>4/24/2023</a:t>
             </a:fld>
             <a:endParaRPr lang="en-US"/>
           </a:p>
@@ -6760,7 +6760,7 @@
           <a:p>
             <a:fld id="{12E8600E-B0EE-4521-BF40-4B72FBA06775}" type="datetimeFigureOut">
               <a:rPr lang="en-IN" smtClean="0"/>
-              <a:t>23-04-2023</a:t>
+              <a:t>24-04-2023</a:t>
             </a:fld>
             <a:endParaRPr lang="en-IN"/>
           </a:p>
@@ -7732,7 +7732,7 @@
           <a:p>
             <a:fld id="{12E8600E-B0EE-4521-BF40-4B72FBA06775}" type="datetimeFigureOut">
               <a:rPr lang="en-IN" smtClean="0"/>
-              <a:t>23-04-2023</a:t>
+              <a:t>24-04-2023</a:t>
             </a:fld>
             <a:endParaRPr lang="en-IN"/>
           </a:p>
@@ -7943,7 +7943,7 @@
           <a:p>
             <a:fld id="{12E8600E-B0EE-4521-BF40-4B72FBA06775}" type="datetimeFigureOut">
               <a:rPr lang="en-IN" smtClean="0"/>
-              <a:t>23-04-2023</a:t>
+              <a:t>24-04-2023</a:t>
             </a:fld>
             <a:endParaRPr lang="en-IN"/>
           </a:p>
@@ -8977,7 +8977,7 @@
           <a:p>
             <a:fld id="{12E8600E-B0EE-4521-BF40-4B72FBA06775}" type="datetimeFigureOut">
               <a:rPr lang="en-IN" smtClean="0"/>
-              <a:t>23-04-2023</a:t>
+              <a:t>24-04-2023</a:t>
             </a:fld>
             <a:endParaRPr lang="en-IN"/>
           </a:p>
@@ -9249,7 +9249,7 @@
           <a:p>
             <a:fld id="{12E8600E-B0EE-4521-BF40-4B72FBA06775}" type="datetimeFigureOut">
               <a:rPr lang="en-IN" smtClean="0"/>
-              <a:t>23-04-2023</a:t>
+              <a:t>24-04-2023</a:t>
             </a:fld>
             <a:endParaRPr lang="en-IN"/>
           </a:p>
@@ -9660,7 +9660,7 @@
             <a:fld id="{49F3E739-D457-46E5-B626-C9B182A007EE}" type="datetimeFigureOut">
               <a:rPr lang="en-US" smtClean="0"/>
               <a:pPr/>
-              <a:t>4/23/2023</a:t>
+              <a:t>4/24/2023</a:t>
             </a:fld>
             <a:endParaRPr lang="en-US"/>
           </a:p>
@@ -9788,7 +9788,7 @@
           <a:p>
             <a:fld id="{12E8600E-B0EE-4521-BF40-4B72FBA06775}" type="datetimeFigureOut">
               <a:rPr lang="en-IN" smtClean="0"/>
-              <a:t>23-04-2023</a:t>
+              <a:t>24-04-2023</a:t>
             </a:fld>
             <a:endParaRPr lang="en-IN"/>
           </a:p>
@@ -9883,7 +9883,7 @@
           <a:p>
             <a:fld id="{12E8600E-B0EE-4521-BF40-4B72FBA06775}" type="datetimeFigureOut">
               <a:rPr lang="en-IN" smtClean="0"/>
-              <a:t>23-04-2023</a:t>
+              <a:t>24-04-2023</a:t>
             </a:fld>
             <a:endParaRPr lang="en-IN"/>
           </a:p>
@@ -10964,7 +10964,7 @@
           <a:p>
             <a:fld id="{12E8600E-B0EE-4521-BF40-4B72FBA06775}" type="datetimeFigureOut">
               <a:rPr lang="en-IN" smtClean="0"/>
-              <a:t>23-04-2023</a:t>
+              <a:t>24-04-2023</a:t>
             </a:fld>
             <a:endParaRPr lang="en-IN"/>
           </a:p>
@@ -12073,7 +12073,7 @@
             <a:fld id="{49F3E739-D457-46E5-B626-C9B182A007EE}" type="datetimeFigureOut">
               <a:rPr lang="en-US" smtClean="0"/>
               <a:pPr/>
-              <a:t>4/23/2023</a:t>
+              <a:t>4/24/2023</a:t>
             </a:fld>
             <a:endParaRPr lang="en-US"/>
           </a:p>
@@ -13072,7 +13072,7 @@
             <a:fld id="{49F3E739-D457-46E5-B626-C9B182A007EE}" type="datetimeFigureOut">
               <a:rPr lang="en-US" smtClean="0"/>
               <a:pPr/>
-              <a:t>4/23/2023</a:t>
+              <a:t>4/24/2023</a:t>
             </a:fld>
             <a:endParaRPr lang="en-US"/>
           </a:p>
@@ -13659,8 +13659,8 @@
           <a:lstStyle/>
           <a:p>
             <a:r>
-              <a:rPr lang="en-US" sz="4800" b="1" i="1" dirty="0"/>
-              <a:t>DAY 10</a:t>
+              <a:rPr lang="en-US" sz="4800" b="1" i="1"/>
+              <a:t>DAY 13</a:t>
             </a:r>
             <a:endParaRPr lang="en-IN" sz="4800" b="1" i="1" dirty="0"/>
           </a:p>
@@ -14251,7 +14251,7 @@
         </p:spPr>
         <p:txBody>
           <a:bodyPr>
-            <a:normAutofit/>
+            <a:normAutofit fontScale="70000" lnSpcReduction="20000"/>
           </a:bodyPr>
           <a:lstStyle/>
           <a:p>
@@ -14263,20 +14263,7 @@
           <a:p>
             <a:r>
               <a:rPr lang="en-IN" dirty="0"/>
-              <a:t>Docker Compose Small App</a:t>
-            </a:r>
-          </a:p>
-          <a:p>
-            <a:pPr lvl="1"/>
-            <a:r>
-              <a:rPr lang="en-IN" dirty="0"/>
-              <a:t>Official Docker</a:t>
-            </a:r>
-          </a:p>
-          <a:p>
-            <a:r>
-              <a:rPr lang="en-IN" dirty="0"/>
-              <a:t>Docker Compose Awesome Examples</a:t>
+              <a:t>Docker Compose links</a:t>
             </a:r>
           </a:p>
           <a:p>
@@ -14285,20 +14272,25 @@
               <a:rPr lang="en-IN" dirty="0">
                 <a:hlinkClick r:id="rId2"/>
               </a:rPr>
-              <a:t>https://github.com/docker/awesome-compose</a:t>
+              <a:t>https://docs.docker.com/compose/reference/</a:t>
             </a:r>
             <a:endParaRPr lang="en-IN" dirty="0"/>
           </a:p>
           <a:p>
+            <a:pPr lvl="1"/>
+            <a:r>
+              <a:rPr lang="en-IN" dirty="0">
+                <a:hlinkClick r:id="rId3"/>
+              </a:rPr>
+              <a:t>https://docs.docker.com/compose/compose-file/compose-versioning/</a:t>
+            </a:r>
+            <a:endParaRPr lang="en-IN" dirty="0"/>
+          </a:p>
+          <a:p>
             <a:r>
               <a:rPr lang="en-IN" dirty="0"/>
-              <a:t>Docker Compose Demo </a:t>
+              <a:t>Docker Compose Demo in details</a:t>
             </a:r>
-            <a:r>
-              <a:rPr lang="en-IN"/>
-              <a:t>in details</a:t>
-            </a:r>
-            <a:endParaRPr lang="en-IN" dirty="0"/>
           </a:p>
           <a:p>
             <a:pPr lvl="1"/>
@@ -14308,16 +14300,76 @@
             </a:r>
             <a:r>
               <a:rPr lang="en-IN" dirty="0">
-                <a:hlinkClick r:id="rId3"/>
+                <a:hlinkClick r:id="rId4"/>
               </a:rPr>
               <a:t>https://github.com/dockersamples/example-voting-app</a:t>
             </a:r>
             <a:endParaRPr lang="en-IN" dirty="0"/>
           </a:p>
           <a:p>
+            <a:r>
+              <a:rPr lang="en-US" dirty="0"/>
+              <a:t>Problems faced with v1.0</a:t>
+            </a:r>
+          </a:p>
+          <a:p>
+            <a:pPr lvl="1"/>
+            <a:r>
+              <a:rPr lang="en-US" dirty="0">
+                <a:hlinkClick r:id="rId5"/>
+              </a:rPr>
+              <a:t>https://geshan.com.np/blog/2021/12/docker-postgres/</a:t>
+            </a:r>
+            <a:endParaRPr lang="en-US" dirty="0"/>
+          </a:p>
+          <a:p>
+            <a:r>
+              <a:rPr lang="en-US" dirty="0" err="1"/>
+              <a:t>Github</a:t>
+            </a:r>
+            <a:r>
+              <a:rPr lang="en-US" dirty="0"/>
+              <a:t> link for v1.0 demo</a:t>
+            </a:r>
+          </a:p>
+          <a:p>
+            <a:pPr lvl="1"/>
+            <a:r>
+              <a:rPr lang="en-US" dirty="0">
+                <a:hlinkClick r:id="rId6"/>
+              </a:rPr>
+              <a:t>https://github.com/deepkumartraining</a:t>
+            </a:r>
+            <a:r>
+              <a:rPr lang="en-US">
+                <a:hlinkClick r:id="rId6"/>
+              </a:rPr>
+              <a:t>/release-example-voting-app</a:t>
+            </a:r>
+            <a:endParaRPr lang="en-US" dirty="0"/>
+          </a:p>
+          <a:p>
+            <a:r>
+              <a:rPr lang="en-US" dirty="0" err="1"/>
+              <a:t>postgresql</a:t>
+            </a:r>
+            <a:r>
+              <a:rPr lang="en-US" dirty="0"/>
+              <a:t> common problem with earlier versions</a:t>
+            </a:r>
+          </a:p>
+          <a:p>
+            <a:pPr lvl="1"/>
+            <a:r>
+              <a:rPr lang="en-IN" dirty="0">
+                <a:hlinkClick r:id="rId7"/>
+              </a:rPr>
+              <a:t>https://itecnote.com/tecnote/postgresql-how-to-solve-problem-with-empty-docker-entrypoint-initdb-d-postgresql-docker/</a:t>
+            </a:r>
             <a:endParaRPr lang="en-IN" dirty="0"/>
           </a:p>
           <a:p>
+            <a:pPr lvl="1"/>
             <a:endParaRPr lang="en-IN" dirty="0"/>
           </a:p>
         </p:txBody>

</xml_diff>